<commit_message>
incorporating slides from Matteo, Mark and Christian
</commit_message>
<xml_diff>
--- a/presentations/f-star.pptx
+++ b/presentations/f-star.pptx
@@ -2040,7 +2040,11 @@
           <a:p>
             <a:r>
               <a:rPr lang="en-US" dirty="0" smtClean="0"/>
-              <a:t>F* - Analytical Model of Resource Federation</a:t>
+              <a:t>F</a:t>
+            </a:r>
+            <a:r>
+              <a:rPr lang="en-US" dirty="0" smtClean="0"/>
+              <a:t>* - Analytical Model of Resource Federation</a:t>
             </a:r>
             <a:endParaRPr lang="en-US" dirty="0"/>
           </a:p>
@@ -2288,7 +2292,7 @@
             <a:pPr marL="344488" indent="-342900"/>
             <a:r>
               <a:rPr lang="en-US" dirty="0" smtClean="0"/>
-              <a:t>Heterogeneous capabilities of I* are aggregated by means of overlays so to offer a unified abstraction to the application layer.</a:t>
+              <a:t>Heterogeneous capabilities of I* are aggregated by means of overlays (red box).</a:t>
             </a:r>
             <a:endParaRPr lang="en-US" dirty="0"/>
           </a:p>
@@ -2296,14 +2300,14 @@
             <a:pPr marL="344488" indent="-342900"/>
             <a:r>
               <a:rPr lang="en-US" dirty="0" smtClean="0"/>
-              <a:t>P* is used as the overlay layer, a way to organize the capabilities exposed by I* into logical containers.</a:t>
+              <a:t>P* is used to aggregate the capabilities exposed by I* into logical containers of resources (red box).</a:t>
             </a:r>
           </a:p>
         </p:txBody>
       </p:sp>
       <p:pic>
         <p:nvPicPr>
-          <p:cNvPr id="6" name="Picture 5" descr="f_star.png"/>
+          <p:cNvPr id="7" name="Picture 6" descr="f_star.png"/>
           <p:cNvPicPr>
             <a:picLocks noChangeAspect="1"/>
           </p:cNvPicPr>
@@ -2323,8 +2327,8 @@
         </p:blipFill>
         <p:spPr>
           <a:xfrm>
-            <a:off x="5564682" y="928148"/>
-            <a:ext cx="2340364" cy="4846320"/>
+            <a:off x="5576062" y="1087421"/>
+            <a:ext cx="3113632" cy="4114800"/>
           </a:xfrm>
           <a:prstGeom prst="rect">
             <a:avLst/>

</xml_diff>